<commit_message>
2019-05: Update FTWG slides
</commit_message>
<xml_diff>
--- a/slides/2019/05/2019-05-31-FTWG-Update.pptx
+++ b/slides/2019/05/2019-05-31-FTWG-Update.pptx
@@ -117,6 +117,11 @@
       </a:defRPr>
     </a:lvl9pPr>
   </p:defaultTextStyle>
+  <p:extLst>
+    <p:ext uri="{EFAFB233-063F-42B5-8137-9DF3F51BA10A}">
+      <p15:sldGuideLst xmlns:p15="http://schemas.microsoft.com/office/powerpoint/2012/main"/>
+    </p:ext>
+  </p:extLst>
 </p:presentation>
 </file>
 
@@ -267,7 +272,7 @@
           <a:p>
             <a:fld id="{E9125E94-C423-5C43-8766-AA82BF1EE7F9}" type="datetimeFigureOut">
               <a:rPr lang="en-US" smtClean="0"/>
-              <a:t>5/29/19</a:t>
+              <a:t>5/31/19</a:t>
             </a:fld>
             <a:endParaRPr lang="en-US"/>
           </a:p>
@@ -465,7 +470,7 @@
           <a:p>
             <a:fld id="{E9125E94-C423-5C43-8766-AA82BF1EE7F9}" type="datetimeFigureOut">
               <a:rPr lang="en-US" smtClean="0"/>
-              <a:t>5/29/19</a:t>
+              <a:t>5/31/19</a:t>
             </a:fld>
             <a:endParaRPr lang="en-US"/>
           </a:p>
@@ -673,7 +678,7 @@
           <a:p>
             <a:fld id="{E9125E94-C423-5C43-8766-AA82BF1EE7F9}" type="datetimeFigureOut">
               <a:rPr lang="en-US" smtClean="0"/>
-              <a:t>5/29/19</a:t>
+              <a:t>5/31/19</a:t>
             </a:fld>
             <a:endParaRPr lang="en-US"/>
           </a:p>
@@ -871,7 +876,7 @@
           <a:p>
             <a:fld id="{E9125E94-C423-5C43-8766-AA82BF1EE7F9}" type="datetimeFigureOut">
               <a:rPr lang="en-US" smtClean="0"/>
-              <a:t>5/29/19</a:t>
+              <a:t>5/31/19</a:t>
             </a:fld>
             <a:endParaRPr lang="en-US"/>
           </a:p>
@@ -1146,7 +1151,7 @@
           <a:p>
             <a:fld id="{E9125E94-C423-5C43-8766-AA82BF1EE7F9}" type="datetimeFigureOut">
               <a:rPr lang="en-US" smtClean="0"/>
-              <a:t>5/29/19</a:t>
+              <a:t>5/31/19</a:t>
             </a:fld>
             <a:endParaRPr lang="en-US"/>
           </a:p>
@@ -1411,7 +1416,7 @@
           <a:p>
             <a:fld id="{E9125E94-C423-5C43-8766-AA82BF1EE7F9}" type="datetimeFigureOut">
               <a:rPr lang="en-US" smtClean="0"/>
-              <a:t>5/29/19</a:t>
+              <a:t>5/31/19</a:t>
             </a:fld>
             <a:endParaRPr lang="en-US"/>
           </a:p>
@@ -1823,7 +1828,7 @@
           <a:p>
             <a:fld id="{E9125E94-C423-5C43-8766-AA82BF1EE7F9}" type="datetimeFigureOut">
               <a:rPr lang="en-US" smtClean="0"/>
-              <a:t>5/29/19</a:t>
+              <a:t>5/31/19</a:t>
             </a:fld>
             <a:endParaRPr lang="en-US"/>
           </a:p>
@@ -1964,7 +1969,7 @@
           <a:p>
             <a:fld id="{E9125E94-C423-5C43-8766-AA82BF1EE7F9}" type="datetimeFigureOut">
               <a:rPr lang="en-US" smtClean="0"/>
-              <a:t>5/29/19</a:t>
+              <a:t>5/31/19</a:t>
             </a:fld>
             <a:endParaRPr lang="en-US"/>
           </a:p>
@@ -2077,7 +2082,7 @@
           <a:p>
             <a:fld id="{E9125E94-C423-5C43-8766-AA82BF1EE7F9}" type="datetimeFigureOut">
               <a:rPr lang="en-US" smtClean="0"/>
-              <a:t>5/29/19</a:t>
+              <a:t>5/31/19</a:t>
             </a:fld>
             <a:endParaRPr lang="en-US"/>
           </a:p>
@@ -2388,7 +2393,7 @@
           <a:p>
             <a:fld id="{E9125E94-C423-5C43-8766-AA82BF1EE7F9}" type="datetimeFigureOut">
               <a:rPr lang="en-US" smtClean="0"/>
-              <a:t>5/29/19</a:t>
+              <a:t>5/31/19</a:t>
             </a:fld>
             <a:endParaRPr lang="en-US"/>
           </a:p>
@@ -2676,7 +2681,7 @@
           <a:p>
             <a:fld id="{E9125E94-C423-5C43-8766-AA82BF1EE7F9}" type="datetimeFigureOut">
               <a:rPr lang="en-US" smtClean="0"/>
-              <a:t>5/29/19</a:t>
+              <a:t>5/31/19</a:t>
             </a:fld>
             <a:endParaRPr lang="en-US"/>
           </a:p>
@@ -2917,7 +2922,7 @@
           <a:p>
             <a:fld id="{E9125E94-C423-5C43-8766-AA82BF1EE7F9}" type="datetimeFigureOut">
               <a:rPr lang="en-US" smtClean="0"/>
-              <a:t>5/29/19</a:t>
+              <a:t>5/31/19</a:t>
             </a:fld>
             <a:endParaRPr lang="en-US"/>
           </a:p>
@@ -3502,7 +3507,7 @@
           <a:p>
             <a:r>
               <a:rPr lang="en-US" dirty="0"/>
-              <a:t>These functions replace what was previously known as MPI_COMM_SHRINK and are more generically useful.</a:t>
+              <a:t>These functions replace what was previously known as MPI_COMM_SHRINK and are more (de)composable.</a:t>
             </a:r>
           </a:p>
         </p:txBody>
@@ -4958,7 +4963,7 @@
           <a:p>
             <a:r>
               <a:rPr lang="en-US" dirty="0"/>
-              <a:t>More Than Just ULFM</a:t>
+              <a:t>Not the ULFM Working Group</a:t>
             </a:r>
           </a:p>
         </p:txBody>
@@ -4998,7 +5003,14 @@
           <a:p>
             <a:r>
               <a:rPr lang="en-US" dirty="0"/>
-              <a:t>The focus includes more than just the widely-known ULFM proposal.</a:t>
+              <a:t>The ULFM proposal will not be brought back as seen previously.</a:t>
+            </a:r>
+          </a:p>
+          <a:p>
+            <a:pPr lvl="1"/>
+            <a:r>
+              <a:rPr lang="en-US" dirty="0"/>
+              <a:t>Want to ensure that FT can be composable and more friendly to legacy apps.</a:t>
             </a:r>
           </a:p>
         </p:txBody>
@@ -5056,6 +5068,13 @@
           <a:p>
             <a:r>
               <a:rPr lang="en-US" dirty="0"/>
+              <a:t>Error Handling and Resilience</a:t>
+            </a:r>
+            <a:br>
+              <a:rPr lang="en-US" dirty="0"/>
+            </a:br>
+            <a:r>
+              <a:rPr lang="en-US" dirty="0"/>
               <a:t>Available in MPI 3.2/4.0</a:t>
             </a:r>
           </a:p>
@@ -5338,7 +5357,7 @@
             <a:pPr lvl="1"/>
             <a:r>
               <a:rPr lang="en-US" dirty="0"/>
-              <a:t>Fine-grained recovery: “Mini-ULFM” – Led by </a:t>
+              <a:t>Fine-grained recovery - Led by </a:t>
             </a:r>
             <a:r>
               <a:rPr lang="en-US" dirty="0" err="1"/>
@@ -5347,19 +5366,30 @@
             <a:endParaRPr lang="en-US" dirty="0"/>
           </a:p>
           <a:p>
+            <a:pPr lvl="2"/>
+            <a:r>
+              <a:rPr lang="en-US" dirty="0"/>
+              <a:t>Pieces from ULFM, but composable with more models</a:t>
+            </a:r>
+          </a:p>
+          <a:p>
             <a:pPr lvl="1"/>
             <a:r>
               <a:rPr lang="en-US" dirty="0"/>
-              <a:t>Course-grained recovery: “</a:t>
+              <a:t>Course-grained recovery – Led by Ignacio</a:t>
+            </a:r>
+          </a:p>
+          <a:p>
+            <a:pPr lvl="2"/>
+            <a:r>
+              <a:rPr lang="en-US" dirty="0"/>
+              <a:t>Known in research as </a:t>
             </a:r>
             <a:r>
               <a:rPr lang="en-US" dirty="0" err="1"/>
               <a:t>Reinit</a:t>
             </a:r>
-            <a:r>
-              <a:rPr lang="en-US" dirty="0"/>
-              <a:t>” – Led by Ignacio</a:t>
-            </a:r>
+            <a:endParaRPr lang="en-US" dirty="0"/>
           </a:p>
           <a:p>
             <a:r>
@@ -5456,15 +5486,7 @@
           <a:p>
             <a:r>
               <a:rPr lang="en-US" dirty="0"/>
-              <a:t>Enables both ULFM-like and </a:t>
-            </a:r>
-            <a:r>
-              <a:rPr lang="en-US" dirty="0" err="1"/>
-              <a:t>Reinit</a:t>
-            </a:r>
-            <a:r>
-              <a:rPr lang="en-US" dirty="0"/>
-              <a:t>-like behavior</a:t>
+              <a:t>Enables both fine and course-grained recovery</a:t>
             </a:r>
           </a:p>
         </p:txBody>
@@ -5599,7 +5621,7 @@
           <a:p>
             <a:r>
               <a:rPr lang="en-US" dirty="0"/>
-              <a:t>Can help enable the uniform error handling model (</a:t>
+              <a:t>Can help enable a uniform error handling model (</a:t>
             </a:r>
             <a:r>
               <a:rPr lang="en-US" dirty="0" err="1"/>
@@ -7785,7 +7807,21 @@
           <a:p>
             <a:r>
               <a:rPr lang="en-US" dirty="0"/>
-              <a:t>Similar to the ULFM functions MPI_COMM_FAILURE_ACK/MPI_COMM_FAILURE_GET_ACKED, but simplified in the common case (and made more flexible when necessary).</a:t>
+              <a:t>Similar to the previously proposed functions MPI_COMM_FAILURE_ACK / MPI_COMM_FAILURE_GET_ACKED</a:t>
+            </a:r>
+          </a:p>
+          <a:p>
+            <a:pPr lvl="1"/>
+            <a:r>
+              <a:rPr lang="en-US" dirty="0"/>
+              <a:t>Simplified in the common case</a:t>
+            </a:r>
+          </a:p>
+          <a:p>
+            <a:pPr lvl="1"/>
+            <a:r>
+              <a:rPr lang="en-US" dirty="0"/>
+              <a:t>Made more flexible when necessary</a:t>
             </a:r>
           </a:p>
         </p:txBody>

</xml_diff>